<commit_message>
added the calcColumnTotal with valid row array version as well
</commit_message>
<xml_diff>
--- a/drafts/du pairs calcTotalColumns.pptx
+++ b/drafts/du pairs calcTotalColumns.pptx
@@ -7,6 +7,8 @@
   <p:sldIdLst>
     <p:sldId id="256" r:id="rId2"/>
     <p:sldId id="257" r:id="rId3"/>
+    <p:sldId id="258" r:id="rId4"/>
+    <p:sldId id="259" r:id="rId5"/>
   </p:sldIdLst>
   <p:sldSz cx="12192000" cy="6858000"/>
   <p:notesSz cx="6858000" cy="9144000"/>
@@ -105,6 +107,11 @@
       </a:defRPr>
     </a:lvl9pPr>
   </p:defaultTextStyle>
+  <p:extLst>
+    <p:ext uri="{EFAFB233-063F-42B5-8137-9DF3F51BA10A}">
+      <p15:sldGuideLst xmlns:p15="http://schemas.microsoft.com/office/powerpoint/2012/main"/>
+    </p:ext>
+  </p:extLst>
 </p:presentation>
 </file>
 
@@ -239,7 +246,7 @@
           <a:p>
             <a:fld id="{ED81A41D-0F35-47D3-9602-E6A894724C35}" type="datetimeFigureOut">
               <a:rPr lang="en-CA" smtClean="0"/>
-              <a:t>2022-03-03</a:t>
+              <a:t>2022-03-04</a:t>
             </a:fld>
             <a:endParaRPr lang="en-CA"/>
           </a:p>
@@ -409,7 +416,7 @@
           <a:p>
             <a:fld id="{ED81A41D-0F35-47D3-9602-E6A894724C35}" type="datetimeFigureOut">
               <a:rPr lang="en-CA" smtClean="0"/>
-              <a:t>2022-03-03</a:t>
+              <a:t>2022-03-04</a:t>
             </a:fld>
             <a:endParaRPr lang="en-CA"/>
           </a:p>
@@ -589,7 +596,7 @@
           <a:p>
             <a:fld id="{ED81A41D-0F35-47D3-9602-E6A894724C35}" type="datetimeFigureOut">
               <a:rPr lang="en-CA" smtClean="0"/>
-              <a:t>2022-03-03</a:t>
+              <a:t>2022-03-04</a:t>
             </a:fld>
             <a:endParaRPr lang="en-CA"/>
           </a:p>
@@ -759,7 +766,7 @@
           <a:p>
             <a:fld id="{ED81A41D-0F35-47D3-9602-E6A894724C35}" type="datetimeFigureOut">
               <a:rPr lang="en-CA" smtClean="0"/>
-              <a:t>2022-03-03</a:t>
+              <a:t>2022-03-04</a:t>
             </a:fld>
             <a:endParaRPr lang="en-CA"/>
           </a:p>
@@ -1005,7 +1012,7 @@
           <a:p>
             <a:fld id="{ED81A41D-0F35-47D3-9602-E6A894724C35}" type="datetimeFigureOut">
               <a:rPr lang="en-CA" smtClean="0"/>
-              <a:t>2022-03-03</a:t>
+              <a:t>2022-03-04</a:t>
             </a:fld>
             <a:endParaRPr lang="en-CA"/>
           </a:p>
@@ -1237,7 +1244,7 @@
           <a:p>
             <a:fld id="{ED81A41D-0F35-47D3-9602-E6A894724C35}" type="datetimeFigureOut">
               <a:rPr lang="en-CA" smtClean="0"/>
-              <a:t>2022-03-03</a:t>
+              <a:t>2022-03-04</a:t>
             </a:fld>
             <a:endParaRPr lang="en-CA"/>
           </a:p>
@@ -1604,7 +1611,7 @@
           <a:p>
             <a:fld id="{ED81A41D-0F35-47D3-9602-E6A894724C35}" type="datetimeFigureOut">
               <a:rPr lang="en-CA" smtClean="0"/>
-              <a:t>2022-03-03</a:t>
+              <a:t>2022-03-04</a:t>
             </a:fld>
             <a:endParaRPr lang="en-CA"/>
           </a:p>
@@ -1722,7 +1729,7 @@
           <a:p>
             <a:fld id="{ED81A41D-0F35-47D3-9602-E6A894724C35}" type="datetimeFigureOut">
               <a:rPr lang="en-CA" smtClean="0"/>
-              <a:t>2022-03-03</a:t>
+              <a:t>2022-03-04</a:t>
             </a:fld>
             <a:endParaRPr lang="en-CA"/>
           </a:p>
@@ -1817,7 +1824,7 @@
           <a:p>
             <a:fld id="{ED81A41D-0F35-47D3-9602-E6A894724C35}" type="datetimeFigureOut">
               <a:rPr lang="en-CA" smtClean="0"/>
-              <a:t>2022-03-03</a:t>
+              <a:t>2022-03-04</a:t>
             </a:fld>
             <a:endParaRPr lang="en-CA"/>
           </a:p>
@@ -2094,7 +2101,7 @@
           <a:p>
             <a:fld id="{ED81A41D-0F35-47D3-9602-E6A894724C35}" type="datetimeFigureOut">
               <a:rPr lang="en-CA" smtClean="0"/>
-              <a:t>2022-03-03</a:t>
+              <a:t>2022-03-04</a:t>
             </a:fld>
             <a:endParaRPr lang="en-CA"/>
           </a:p>
@@ -2347,7 +2354,7 @@
           <a:p>
             <a:fld id="{ED81A41D-0F35-47D3-9602-E6A894724C35}" type="datetimeFigureOut">
               <a:rPr lang="en-CA" smtClean="0"/>
-              <a:t>2022-03-03</a:t>
+              <a:t>2022-03-04</a:t>
             </a:fld>
             <a:endParaRPr lang="en-CA"/>
           </a:p>
@@ -2560,7 +2567,7 @@
           <a:p>
             <a:fld id="{ED81A41D-0F35-47D3-9602-E6A894724C35}" type="datetimeFigureOut">
               <a:rPr lang="en-CA" smtClean="0"/>
-              <a:t>2022-03-03</a:t>
+              <a:t>2022-03-04</a:t>
             </a:fld>
             <a:endParaRPr lang="en-CA"/>
           </a:p>
@@ -3951,6 +3958,132 @@
           </a:p>
         </p:txBody>
       </p:sp>
+      <p:cxnSp>
+        <p:nvCxnSpPr>
+          <p:cNvPr id="3" name="Straight Arrow Connector 2"/>
+          <p:cNvCxnSpPr/>
+          <p:nvPr/>
+        </p:nvCxnSpPr>
+        <p:spPr>
+          <a:xfrm>
+            <a:off x="438659" y="3918857"/>
+            <a:ext cx="192712" cy="364281"/>
+          </a:xfrm>
+          <a:prstGeom prst="straightConnector1">
+            <a:avLst/>
+          </a:prstGeom>
+          <a:ln>
+            <a:tailEnd type="triangle"/>
+          </a:ln>
+        </p:spPr>
+        <p:style>
+          <a:lnRef idx="1">
+            <a:schemeClr val="accent1"/>
+          </a:lnRef>
+          <a:fillRef idx="0">
+            <a:schemeClr val="accent1"/>
+          </a:fillRef>
+          <a:effectRef idx="0">
+            <a:schemeClr val="accent1"/>
+          </a:effectRef>
+          <a:fontRef idx="minor">
+            <a:schemeClr val="tx1"/>
+          </a:fontRef>
+        </p:style>
+      </p:cxnSp>
+      <p:sp>
+        <p:nvSpPr>
+          <p:cNvPr id="4" name="TextBox 3"/>
+          <p:cNvSpPr txBox="1"/>
+          <p:nvPr/>
+        </p:nvSpPr>
+        <p:spPr>
+          <a:xfrm>
+            <a:off x="138801" y="3586451"/>
+            <a:ext cx="599716" cy="369332"/>
+          </a:xfrm>
+          <a:prstGeom prst="rect">
+            <a:avLst/>
+          </a:prstGeom>
+          <a:noFill/>
+        </p:spPr>
+        <p:txBody>
+          <a:bodyPr wrap="none" rtlCol="0">
+            <a:spAutoFit/>
+          </a:bodyPr>
+          <a:lstStyle/>
+          <a:p>
+            <a:r>
+              <a:rPr lang="en-US" dirty="0" smtClean="0"/>
+              <a:t>data</a:t>
+            </a:r>
+            <a:endParaRPr lang="en-CA" dirty="0"/>
+          </a:p>
+        </p:txBody>
+      </p:sp>
+      <p:cxnSp>
+        <p:nvCxnSpPr>
+          <p:cNvPr id="37" name="Straight Arrow Connector 36"/>
+          <p:cNvCxnSpPr/>
+          <p:nvPr/>
+        </p:nvCxnSpPr>
+        <p:spPr>
+          <a:xfrm>
+            <a:off x="1080916" y="3951514"/>
+            <a:ext cx="192712" cy="364281"/>
+          </a:xfrm>
+          <a:prstGeom prst="straightConnector1">
+            <a:avLst/>
+          </a:prstGeom>
+          <a:ln>
+            <a:tailEnd type="triangle"/>
+          </a:ln>
+        </p:spPr>
+        <p:style>
+          <a:lnRef idx="1">
+            <a:schemeClr val="accent1"/>
+          </a:lnRef>
+          <a:fillRef idx="0">
+            <a:schemeClr val="accent1"/>
+          </a:fillRef>
+          <a:effectRef idx="0">
+            <a:schemeClr val="accent1"/>
+          </a:effectRef>
+          <a:fontRef idx="minor">
+            <a:schemeClr val="tx1"/>
+          </a:fontRef>
+        </p:style>
+      </p:cxnSp>
+      <p:sp>
+        <p:nvSpPr>
+          <p:cNvPr id="38" name="TextBox 37"/>
+          <p:cNvSpPr txBox="1"/>
+          <p:nvPr/>
+        </p:nvSpPr>
+        <p:spPr>
+          <a:xfrm>
+            <a:off x="781058" y="3619108"/>
+            <a:ext cx="883255" cy="369332"/>
+          </a:xfrm>
+          <a:prstGeom prst="rect">
+            <a:avLst/>
+          </a:prstGeom>
+          <a:noFill/>
+        </p:spPr>
+        <p:txBody>
+          <a:bodyPr wrap="none" rtlCol="0">
+            <a:spAutoFit/>
+          </a:bodyPr>
+          <a:lstStyle/>
+          <a:p>
+            <a:r>
+              <a:rPr lang="en-US" dirty="0" smtClean="0"/>
+              <a:t>column</a:t>
+            </a:r>
+            <a:endParaRPr lang="en-CA" dirty="0"/>
+          </a:p>
+        </p:txBody>
+      </p:sp>
     </p:spTree>
     <p:extLst>
       <p:ext uri="{BB962C8B-B14F-4D97-AF65-F5344CB8AC3E}">
@@ -4071,6 +4204,1520 @@
     <p:extLst>
       <p:ext uri="{BB962C8B-B14F-4D97-AF65-F5344CB8AC3E}">
         <p14:creationId xmlns:p14="http://schemas.microsoft.com/office/powerpoint/2010/main" val="4279481461"/>
+      </p:ext>
+    </p:extLst>
+  </p:cSld>
+  <p:clrMapOvr>
+    <a:masterClrMapping/>
+  </p:clrMapOvr>
+</p:sld>
+</file>
+
+<file path=ppt/slides/slide3.xml><?xml version="1.0" encoding="utf-8"?>
+<p:sld xmlns:a="http://schemas.openxmlformats.org/drawingml/2006/main" xmlns:r="http://schemas.openxmlformats.org/officeDocument/2006/relationships" xmlns:p="http://schemas.openxmlformats.org/presentationml/2006/main">
+  <p:cSld>
+    <p:spTree>
+      <p:nvGrpSpPr>
+        <p:cNvPr id="1" name=""/>
+        <p:cNvGrpSpPr/>
+        <p:nvPr/>
+      </p:nvGrpSpPr>
+      <p:grpSpPr>
+        <a:xfrm>
+          <a:off x="0" y="0"/>
+          <a:ext cx="0" cy="0"/>
+          <a:chOff x="0" y="0"/>
+          <a:chExt cx="0" cy="0"/>
+        </a:xfrm>
+      </p:grpSpPr>
+      <p:pic>
+        <p:nvPicPr>
+          <p:cNvPr id="4" name="Picture 3"/>
+          <p:cNvPicPr>
+            <a:picLocks noChangeAspect="1"/>
+          </p:cNvPicPr>
+          <p:nvPr/>
+        </p:nvPicPr>
+        <p:blipFill>
+          <a:blip r:embed="rId2" cstate="print">
+            <a:extLst>
+              <a:ext uri="{28A0092B-C50C-407E-A947-70E740481C1C}">
+                <a14:useLocalDpi xmlns:a14="http://schemas.microsoft.com/office/drawing/2010/main" val="0"/>
+              </a:ext>
+            </a:extLst>
+          </a:blip>
+          <a:stretch>
+            <a:fillRect/>
+          </a:stretch>
+        </p:blipFill>
+        <p:spPr>
+          <a:xfrm>
+            <a:off x="3007557" y="65316"/>
+            <a:ext cx="6176885" cy="6858000"/>
+          </a:xfrm>
+          <a:prstGeom prst="rect">
+            <a:avLst/>
+          </a:prstGeom>
+        </p:spPr>
+      </p:pic>
+      <p:sp>
+        <p:nvSpPr>
+          <p:cNvPr id="5" name="Right Brace 4"/>
+          <p:cNvSpPr/>
+          <p:nvPr/>
+        </p:nvSpPr>
+        <p:spPr>
+          <a:xfrm>
+            <a:off x="8784771" y="130629"/>
+            <a:ext cx="631372" cy="1055914"/>
+          </a:xfrm>
+          <a:prstGeom prst="rightBrace">
+            <a:avLst/>
+          </a:prstGeom>
+        </p:spPr>
+        <p:style>
+          <a:lnRef idx="1">
+            <a:schemeClr val="accent1"/>
+          </a:lnRef>
+          <a:fillRef idx="0">
+            <a:schemeClr val="accent1"/>
+          </a:fillRef>
+          <a:effectRef idx="0">
+            <a:schemeClr val="accent1"/>
+          </a:effectRef>
+          <a:fontRef idx="minor">
+            <a:schemeClr val="tx1"/>
+          </a:fontRef>
+        </p:style>
+        <p:txBody>
+          <a:bodyPr rtlCol="0" anchor="ctr"/>
+          <a:lstStyle/>
+          <a:p>
+            <a:pPr algn="ctr"/>
+            <a:endParaRPr lang="en-CA"/>
+          </a:p>
+        </p:txBody>
+      </p:sp>
+      <p:sp>
+        <p:nvSpPr>
+          <p:cNvPr id="6" name="TextBox 5"/>
+          <p:cNvSpPr txBox="1"/>
+          <p:nvPr/>
+        </p:nvSpPr>
+        <p:spPr>
+          <a:xfrm>
+            <a:off x="9614020" y="473920"/>
+            <a:ext cx="423514" cy="369332"/>
+          </a:xfrm>
+          <a:prstGeom prst="rect">
+            <a:avLst/>
+          </a:prstGeom>
+          <a:noFill/>
+        </p:spPr>
+        <p:txBody>
+          <a:bodyPr wrap="none" rtlCol="0">
+            <a:spAutoFit/>
+          </a:bodyPr>
+          <a:lstStyle/>
+          <a:p>
+            <a:r>
+              <a:rPr lang="en-US" dirty="0" smtClean="0"/>
+              <a:t>n1</a:t>
+            </a:r>
+            <a:endParaRPr lang="en-CA" dirty="0"/>
+          </a:p>
+        </p:txBody>
+      </p:sp>
+      <p:sp>
+        <p:nvSpPr>
+          <p:cNvPr id="7" name="Right Brace 6"/>
+          <p:cNvSpPr/>
+          <p:nvPr/>
+        </p:nvSpPr>
+        <p:spPr>
+          <a:xfrm>
+            <a:off x="8784771" y="1186543"/>
+            <a:ext cx="631372" cy="494909"/>
+          </a:xfrm>
+          <a:prstGeom prst="rightBrace">
+            <a:avLst/>
+          </a:prstGeom>
+        </p:spPr>
+        <p:style>
+          <a:lnRef idx="1">
+            <a:schemeClr val="accent1"/>
+          </a:lnRef>
+          <a:fillRef idx="0">
+            <a:schemeClr val="accent1"/>
+          </a:fillRef>
+          <a:effectRef idx="0">
+            <a:schemeClr val="accent1"/>
+          </a:effectRef>
+          <a:fontRef idx="minor">
+            <a:schemeClr val="tx1"/>
+          </a:fontRef>
+        </p:style>
+        <p:txBody>
+          <a:bodyPr rtlCol="0" anchor="ctr"/>
+          <a:lstStyle/>
+          <a:p>
+            <a:pPr algn="ctr"/>
+            <a:endParaRPr lang="en-CA"/>
+          </a:p>
+        </p:txBody>
+      </p:sp>
+      <p:sp>
+        <p:nvSpPr>
+          <p:cNvPr id="8" name="TextBox 7"/>
+          <p:cNvSpPr txBox="1"/>
+          <p:nvPr/>
+        </p:nvSpPr>
+        <p:spPr>
+          <a:xfrm>
+            <a:off x="9614020" y="1312120"/>
+            <a:ext cx="423514" cy="369332"/>
+          </a:xfrm>
+          <a:prstGeom prst="rect">
+            <a:avLst/>
+          </a:prstGeom>
+          <a:noFill/>
+        </p:spPr>
+        <p:txBody>
+          <a:bodyPr wrap="none" rtlCol="0">
+            <a:spAutoFit/>
+          </a:bodyPr>
+          <a:lstStyle/>
+          <a:p>
+            <a:r>
+              <a:rPr lang="en-US" dirty="0" smtClean="0"/>
+              <a:t>n2</a:t>
+            </a:r>
+            <a:endParaRPr lang="en-CA" dirty="0"/>
+          </a:p>
+        </p:txBody>
+      </p:sp>
+      <p:sp>
+        <p:nvSpPr>
+          <p:cNvPr id="9" name="Right Brace 8"/>
+          <p:cNvSpPr/>
+          <p:nvPr/>
+        </p:nvSpPr>
+        <p:spPr>
+          <a:xfrm>
+            <a:off x="8784771" y="1692723"/>
+            <a:ext cx="631372" cy="620486"/>
+          </a:xfrm>
+          <a:prstGeom prst="rightBrace">
+            <a:avLst/>
+          </a:prstGeom>
+        </p:spPr>
+        <p:style>
+          <a:lnRef idx="1">
+            <a:schemeClr val="accent1"/>
+          </a:lnRef>
+          <a:fillRef idx="0">
+            <a:schemeClr val="accent1"/>
+          </a:fillRef>
+          <a:effectRef idx="0">
+            <a:schemeClr val="accent1"/>
+          </a:effectRef>
+          <a:fontRef idx="minor">
+            <a:schemeClr val="tx1"/>
+          </a:fontRef>
+        </p:style>
+        <p:txBody>
+          <a:bodyPr rtlCol="0" anchor="ctr"/>
+          <a:lstStyle/>
+          <a:p>
+            <a:pPr algn="ctr"/>
+            <a:endParaRPr lang="en-CA"/>
+          </a:p>
+        </p:txBody>
+      </p:sp>
+      <p:sp>
+        <p:nvSpPr>
+          <p:cNvPr id="10" name="TextBox 9"/>
+          <p:cNvSpPr txBox="1"/>
+          <p:nvPr/>
+        </p:nvSpPr>
+        <p:spPr>
+          <a:xfrm>
+            <a:off x="9603134" y="1763877"/>
+            <a:ext cx="423514" cy="369332"/>
+          </a:xfrm>
+          <a:prstGeom prst="rect">
+            <a:avLst/>
+          </a:prstGeom>
+          <a:noFill/>
+        </p:spPr>
+        <p:txBody>
+          <a:bodyPr wrap="none" rtlCol="0">
+            <a:spAutoFit/>
+          </a:bodyPr>
+          <a:lstStyle/>
+          <a:p>
+            <a:r>
+              <a:rPr lang="en-US" dirty="0" smtClean="0"/>
+              <a:t>n3</a:t>
+            </a:r>
+            <a:endParaRPr lang="en-CA" dirty="0"/>
+          </a:p>
+        </p:txBody>
+      </p:sp>
+      <p:sp>
+        <p:nvSpPr>
+          <p:cNvPr id="11" name="Right Brace 10"/>
+          <p:cNvSpPr/>
+          <p:nvPr/>
+        </p:nvSpPr>
+        <p:spPr>
+          <a:xfrm>
+            <a:off x="8767859" y="2313209"/>
+            <a:ext cx="631372" cy="403943"/>
+          </a:xfrm>
+          <a:prstGeom prst="rightBrace">
+            <a:avLst/>
+          </a:prstGeom>
+        </p:spPr>
+        <p:style>
+          <a:lnRef idx="1">
+            <a:schemeClr val="accent1"/>
+          </a:lnRef>
+          <a:fillRef idx="0">
+            <a:schemeClr val="accent1"/>
+          </a:fillRef>
+          <a:effectRef idx="0">
+            <a:schemeClr val="accent1"/>
+          </a:effectRef>
+          <a:fontRef idx="minor">
+            <a:schemeClr val="tx1"/>
+          </a:fontRef>
+        </p:style>
+        <p:txBody>
+          <a:bodyPr rtlCol="0" anchor="ctr"/>
+          <a:lstStyle/>
+          <a:p>
+            <a:pPr algn="ctr"/>
+            <a:endParaRPr lang="en-CA"/>
+          </a:p>
+        </p:txBody>
+      </p:sp>
+      <p:sp>
+        <p:nvSpPr>
+          <p:cNvPr id="12" name="TextBox 11"/>
+          <p:cNvSpPr txBox="1"/>
+          <p:nvPr/>
+        </p:nvSpPr>
+        <p:spPr>
+          <a:xfrm>
+            <a:off x="9496998" y="2331881"/>
+            <a:ext cx="423514" cy="369332"/>
+          </a:xfrm>
+          <a:prstGeom prst="rect">
+            <a:avLst/>
+          </a:prstGeom>
+          <a:noFill/>
+        </p:spPr>
+        <p:txBody>
+          <a:bodyPr wrap="none" rtlCol="0">
+            <a:spAutoFit/>
+          </a:bodyPr>
+          <a:lstStyle/>
+          <a:p>
+            <a:r>
+              <a:rPr lang="en-US" dirty="0" smtClean="0"/>
+              <a:t>n4</a:t>
+            </a:r>
+            <a:endParaRPr lang="en-CA" dirty="0"/>
+          </a:p>
+        </p:txBody>
+      </p:sp>
+      <p:sp>
+        <p:nvSpPr>
+          <p:cNvPr id="13" name="Right Brace 12"/>
+          <p:cNvSpPr/>
+          <p:nvPr/>
+        </p:nvSpPr>
+        <p:spPr>
+          <a:xfrm>
+            <a:off x="7014422" y="2955471"/>
+            <a:ext cx="631372" cy="620486"/>
+          </a:xfrm>
+          <a:prstGeom prst="rightBrace">
+            <a:avLst/>
+          </a:prstGeom>
+        </p:spPr>
+        <p:style>
+          <a:lnRef idx="1">
+            <a:schemeClr val="accent1"/>
+          </a:lnRef>
+          <a:fillRef idx="0">
+            <a:schemeClr val="accent1"/>
+          </a:fillRef>
+          <a:effectRef idx="0">
+            <a:schemeClr val="accent1"/>
+          </a:effectRef>
+          <a:fontRef idx="minor">
+            <a:schemeClr val="tx1"/>
+          </a:fontRef>
+        </p:style>
+        <p:txBody>
+          <a:bodyPr rtlCol="0" anchor="ctr"/>
+          <a:lstStyle/>
+          <a:p>
+            <a:pPr algn="ctr"/>
+            <a:endParaRPr lang="en-CA"/>
+          </a:p>
+        </p:txBody>
+      </p:sp>
+      <p:sp>
+        <p:nvSpPr>
+          <p:cNvPr id="14" name="TextBox 13"/>
+          <p:cNvSpPr txBox="1"/>
+          <p:nvPr/>
+        </p:nvSpPr>
+        <p:spPr>
+          <a:xfrm>
+            <a:off x="7843671" y="3081048"/>
+            <a:ext cx="423514" cy="369332"/>
+          </a:xfrm>
+          <a:prstGeom prst="rect">
+            <a:avLst/>
+          </a:prstGeom>
+          <a:noFill/>
+        </p:spPr>
+        <p:txBody>
+          <a:bodyPr wrap="none" rtlCol="0">
+            <a:spAutoFit/>
+          </a:bodyPr>
+          <a:lstStyle/>
+          <a:p>
+            <a:r>
+              <a:rPr lang="en-US" dirty="0" smtClean="0"/>
+              <a:t>n5</a:t>
+            </a:r>
+            <a:endParaRPr lang="en-CA" dirty="0"/>
+          </a:p>
+        </p:txBody>
+      </p:sp>
+      <p:sp>
+        <p:nvSpPr>
+          <p:cNvPr id="15" name="Right Brace 14"/>
+          <p:cNvSpPr/>
+          <p:nvPr/>
+        </p:nvSpPr>
+        <p:spPr>
+          <a:xfrm>
+            <a:off x="7014422" y="3586839"/>
+            <a:ext cx="631372" cy="620486"/>
+          </a:xfrm>
+          <a:prstGeom prst="rightBrace">
+            <a:avLst/>
+          </a:prstGeom>
+        </p:spPr>
+        <p:style>
+          <a:lnRef idx="1">
+            <a:schemeClr val="accent1"/>
+          </a:lnRef>
+          <a:fillRef idx="0">
+            <a:schemeClr val="accent1"/>
+          </a:fillRef>
+          <a:effectRef idx="0">
+            <a:schemeClr val="accent1"/>
+          </a:effectRef>
+          <a:fontRef idx="minor">
+            <a:schemeClr val="tx1"/>
+          </a:fontRef>
+        </p:style>
+        <p:txBody>
+          <a:bodyPr rtlCol="0" anchor="ctr"/>
+          <a:lstStyle/>
+          <a:p>
+            <a:pPr algn="ctr"/>
+            <a:endParaRPr lang="en-CA"/>
+          </a:p>
+        </p:txBody>
+      </p:sp>
+      <p:sp>
+        <p:nvSpPr>
+          <p:cNvPr id="16" name="TextBox 15"/>
+          <p:cNvSpPr txBox="1"/>
+          <p:nvPr/>
+        </p:nvSpPr>
+        <p:spPr>
+          <a:xfrm>
+            <a:off x="7843671" y="3712416"/>
+            <a:ext cx="423514" cy="369332"/>
+          </a:xfrm>
+          <a:prstGeom prst="rect">
+            <a:avLst/>
+          </a:prstGeom>
+          <a:noFill/>
+        </p:spPr>
+        <p:txBody>
+          <a:bodyPr wrap="none" rtlCol="0">
+            <a:spAutoFit/>
+          </a:bodyPr>
+          <a:lstStyle/>
+          <a:p>
+            <a:r>
+              <a:rPr lang="en-US" dirty="0" smtClean="0"/>
+              <a:t>n6</a:t>
+            </a:r>
+            <a:endParaRPr lang="en-CA" dirty="0"/>
+          </a:p>
+        </p:txBody>
+      </p:sp>
+      <p:sp>
+        <p:nvSpPr>
+          <p:cNvPr id="17" name="Right Brace 16"/>
+          <p:cNvSpPr/>
+          <p:nvPr/>
+        </p:nvSpPr>
+        <p:spPr>
+          <a:xfrm flipH="1">
+            <a:off x="3122719" y="3467490"/>
+            <a:ext cx="631372" cy="620486"/>
+          </a:xfrm>
+          <a:prstGeom prst="rightBrace">
+            <a:avLst/>
+          </a:prstGeom>
+        </p:spPr>
+        <p:style>
+          <a:lnRef idx="1">
+            <a:schemeClr val="accent1"/>
+          </a:lnRef>
+          <a:fillRef idx="0">
+            <a:schemeClr val="accent1"/>
+          </a:fillRef>
+          <a:effectRef idx="0">
+            <a:schemeClr val="accent1"/>
+          </a:effectRef>
+          <a:fontRef idx="minor">
+            <a:schemeClr val="tx1"/>
+          </a:fontRef>
+        </p:style>
+        <p:txBody>
+          <a:bodyPr rtlCol="0" anchor="ctr"/>
+          <a:lstStyle/>
+          <a:p>
+            <a:pPr algn="ctr"/>
+            <a:endParaRPr lang="en-CA"/>
+          </a:p>
+        </p:txBody>
+      </p:sp>
+      <p:sp>
+        <p:nvSpPr>
+          <p:cNvPr id="18" name="TextBox 17"/>
+          <p:cNvSpPr txBox="1"/>
+          <p:nvPr/>
+        </p:nvSpPr>
+        <p:spPr>
+          <a:xfrm>
+            <a:off x="2585873" y="3521528"/>
+            <a:ext cx="423514" cy="369332"/>
+          </a:xfrm>
+          <a:prstGeom prst="rect">
+            <a:avLst/>
+          </a:prstGeom>
+          <a:noFill/>
+        </p:spPr>
+        <p:txBody>
+          <a:bodyPr wrap="none" rtlCol="0">
+            <a:spAutoFit/>
+          </a:bodyPr>
+          <a:lstStyle/>
+          <a:p>
+            <a:r>
+              <a:rPr lang="en-US" dirty="0" smtClean="0"/>
+              <a:t>n7</a:t>
+            </a:r>
+            <a:endParaRPr lang="en-CA" dirty="0"/>
+          </a:p>
+        </p:txBody>
+      </p:sp>
+      <p:sp>
+        <p:nvSpPr>
+          <p:cNvPr id="19" name="Right Brace 18"/>
+          <p:cNvSpPr/>
+          <p:nvPr/>
+        </p:nvSpPr>
+        <p:spPr>
+          <a:xfrm flipH="1">
+            <a:off x="3155373" y="4131522"/>
+            <a:ext cx="631372" cy="527564"/>
+          </a:xfrm>
+          <a:prstGeom prst="rightBrace">
+            <a:avLst/>
+          </a:prstGeom>
+        </p:spPr>
+        <p:style>
+          <a:lnRef idx="1">
+            <a:schemeClr val="accent1"/>
+          </a:lnRef>
+          <a:fillRef idx="0">
+            <a:schemeClr val="accent1"/>
+          </a:fillRef>
+          <a:effectRef idx="0">
+            <a:schemeClr val="accent1"/>
+          </a:effectRef>
+          <a:fontRef idx="minor">
+            <a:schemeClr val="tx1"/>
+          </a:fontRef>
+        </p:style>
+        <p:txBody>
+          <a:bodyPr rtlCol="0" anchor="ctr"/>
+          <a:lstStyle/>
+          <a:p>
+            <a:pPr algn="ctr"/>
+            <a:endParaRPr lang="en-CA"/>
+          </a:p>
+        </p:txBody>
+      </p:sp>
+      <p:sp>
+        <p:nvSpPr>
+          <p:cNvPr id="20" name="TextBox 19"/>
+          <p:cNvSpPr txBox="1"/>
+          <p:nvPr/>
+        </p:nvSpPr>
+        <p:spPr>
+          <a:xfrm>
+            <a:off x="2618527" y="4185560"/>
+            <a:ext cx="423514" cy="369332"/>
+          </a:xfrm>
+          <a:prstGeom prst="rect">
+            <a:avLst/>
+          </a:prstGeom>
+          <a:noFill/>
+        </p:spPr>
+        <p:txBody>
+          <a:bodyPr wrap="none" rtlCol="0">
+            <a:spAutoFit/>
+          </a:bodyPr>
+          <a:lstStyle/>
+          <a:p>
+            <a:r>
+              <a:rPr lang="en-US" dirty="0" smtClean="0"/>
+              <a:t>n8</a:t>
+            </a:r>
+            <a:endParaRPr lang="en-CA" dirty="0"/>
+          </a:p>
+        </p:txBody>
+      </p:sp>
+      <p:sp>
+        <p:nvSpPr>
+          <p:cNvPr id="21" name="Right Brace 20"/>
+          <p:cNvSpPr/>
+          <p:nvPr/>
+        </p:nvSpPr>
+        <p:spPr>
+          <a:xfrm flipH="1">
+            <a:off x="3155372" y="4741118"/>
+            <a:ext cx="631372" cy="620486"/>
+          </a:xfrm>
+          <a:prstGeom prst="rightBrace">
+            <a:avLst/>
+          </a:prstGeom>
+        </p:spPr>
+        <p:style>
+          <a:lnRef idx="1">
+            <a:schemeClr val="accent1"/>
+          </a:lnRef>
+          <a:fillRef idx="0">
+            <a:schemeClr val="accent1"/>
+          </a:fillRef>
+          <a:effectRef idx="0">
+            <a:schemeClr val="accent1"/>
+          </a:effectRef>
+          <a:fontRef idx="minor">
+            <a:schemeClr val="tx1"/>
+          </a:fontRef>
+        </p:style>
+        <p:txBody>
+          <a:bodyPr rtlCol="0" anchor="ctr"/>
+          <a:lstStyle/>
+          <a:p>
+            <a:pPr algn="ctr"/>
+            <a:endParaRPr lang="en-CA"/>
+          </a:p>
+        </p:txBody>
+      </p:sp>
+      <p:sp>
+        <p:nvSpPr>
+          <p:cNvPr id="22" name="TextBox 21"/>
+          <p:cNvSpPr txBox="1"/>
+          <p:nvPr/>
+        </p:nvSpPr>
+        <p:spPr>
+          <a:xfrm>
+            <a:off x="2640298" y="4914902"/>
+            <a:ext cx="423514" cy="369332"/>
+          </a:xfrm>
+          <a:prstGeom prst="rect">
+            <a:avLst/>
+          </a:prstGeom>
+          <a:noFill/>
+        </p:spPr>
+        <p:txBody>
+          <a:bodyPr wrap="none" rtlCol="0">
+            <a:spAutoFit/>
+          </a:bodyPr>
+          <a:lstStyle/>
+          <a:p>
+            <a:r>
+              <a:rPr lang="en-US" dirty="0" smtClean="0"/>
+              <a:t>n9</a:t>
+            </a:r>
+            <a:endParaRPr lang="en-CA" dirty="0"/>
+          </a:p>
+        </p:txBody>
+      </p:sp>
+      <p:sp>
+        <p:nvSpPr>
+          <p:cNvPr id="23" name="Right Brace 22"/>
+          <p:cNvSpPr/>
+          <p:nvPr/>
+        </p:nvSpPr>
+        <p:spPr>
+          <a:xfrm>
+            <a:off x="7014422" y="6397880"/>
+            <a:ext cx="631372" cy="431149"/>
+          </a:xfrm>
+          <a:prstGeom prst="rightBrace">
+            <a:avLst/>
+          </a:prstGeom>
+        </p:spPr>
+        <p:style>
+          <a:lnRef idx="1">
+            <a:schemeClr val="accent1"/>
+          </a:lnRef>
+          <a:fillRef idx="0">
+            <a:schemeClr val="accent1"/>
+          </a:fillRef>
+          <a:effectRef idx="0">
+            <a:schemeClr val="accent1"/>
+          </a:effectRef>
+          <a:fontRef idx="minor">
+            <a:schemeClr val="tx1"/>
+          </a:fontRef>
+        </p:style>
+        <p:txBody>
+          <a:bodyPr rtlCol="0" anchor="ctr"/>
+          <a:lstStyle/>
+          <a:p>
+            <a:pPr algn="ctr"/>
+            <a:endParaRPr lang="en-CA"/>
+          </a:p>
+        </p:txBody>
+      </p:sp>
+      <p:sp>
+        <p:nvSpPr>
+          <p:cNvPr id="24" name="TextBox 23"/>
+          <p:cNvSpPr txBox="1"/>
+          <p:nvPr/>
+        </p:nvSpPr>
+        <p:spPr>
+          <a:xfrm>
+            <a:off x="7778355" y="6428797"/>
+            <a:ext cx="540533" cy="369332"/>
+          </a:xfrm>
+          <a:prstGeom prst="rect">
+            <a:avLst/>
+          </a:prstGeom>
+          <a:noFill/>
+        </p:spPr>
+        <p:txBody>
+          <a:bodyPr wrap="none" rtlCol="0">
+            <a:spAutoFit/>
+          </a:bodyPr>
+          <a:lstStyle/>
+          <a:p>
+            <a:r>
+              <a:rPr lang="en-US" dirty="0" smtClean="0"/>
+              <a:t>n12</a:t>
+            </a:r>
+            <a:endParaRPr lang="en-CA" dirty="0"/>
+          </a:p>
+        </p:txBody>
+      </p:sp>
+      <p:sp>
+        <p:nvSpPr>
+          <p:cNvPr id="25" name="TextBox 24"/>
+          <p:cNvSpPr txBox="1"/>
+          <p:nvPr/>
+        </p:nvSpPr>
+        <p:spPr>
+          <a:xfrm>
+            <a:off x="5123691" y="1681452"/>
+            <a:ext cx="617477" cy="369332"/>
+          </a:xfrm>
+          <a:prstGeom prst="rect">
+            <a:avLst/>
+          </a:prstGeom>
+          <a:noFill/>
+        </p:spPr>
+        <p:txBody>
+          <a:bodyPr wrap="none" rtlCol="0">
+            <a:spAutoFit/>
+          </a:bodyPr>
+          <a:lstStyle/>
+          <a:p>
+            <a:r>
+              <a:rPr lang="en-US" dirty="0" smtClean="0"/>
+              <a:t>(1,3)</a:t>
+            </a:r>
+            <a:endParaRPr lang="en-CA" dirty="0"/>
+          </a:p>
+        </p:txBody>
+      </p:sp>
+      <p:sp>
+        <p:nvSpPr>
+          <p:cNvPr id="26" name="TextBox 25"/>
+          <p:cNvSpPr txBox="1"/>
+          <p:nvPr/>
+        </p:nvSpPr>
+        <p:spPr>
+          <a:xfrm>
+            <a:off x="3786744" y="305974"/>
+            <a:ext cx="617477" cy="369332"/>
+          </a:xfrm>
+          <a:prstGeom prst="rect">
+            <a:avLst/>
+          </a:prstGeom>
+          <a:noFill/>
+        </p:spPr>
+        <p:txBody>
+          <a:bodyPr wrap="none" rtlCol="0">
+            <a:spAutoFit/>
+          </a:bodyPr>
+          <a:lstStyle/>
+          <a:p>
+            <a:r>
+              <a:rPr lang="en-US" dirty="0" smtClean="0"/>
+              <a:t>(1,1)</a:t>
+            </a:r>
+            <a:endParaRPr lang="en-CA" dirty="0"/>
+          </a:p>
+        </p:txBody>
+      </p:sp>
+      <p:sp>
+        <p:nvSpPr>
+          <p:cNvPr id="27" name="TextBox 26"/>
+          <p:cNvSpPr txBox="1"/>
+          <p:nvPr/>
+        </p:nvSpPr>
+        <p:spPr>
+          <a:xfrm>
+            <a:off x="503975" y="3499367"/>
+            <a:ext cx="1683474" cy="369332"/>
+          </a:xfrm>
+          <a:prstGeom prst="rect">
+            <a:avLst/>
+          </a:prstGeom>
+          <a:noFill/>
+        </p:spPr>
+        <p:txBody>
+          <a:bodyPr wrap="none" rtlCol="0">
+            <a:spAutoFit/>
+          </a:bodyPr>
+          <a:lstStyle/>
+          <a:p>
+            <a:r>
+              <a:rPr lang="en-US" dirty="0" smtClean="0"/>
+              <a:t>(</a:t>
+            </a:r>
+            <a:r>
+              <a:rPr lang="en-US" dirty="0" smtClean="0"/>
+              <a:t>1,7),(&lt;</a:t>
+            </a:r>
+            <a:r>
+              <a:rPr lang="en-US" dirty="0" smtClean="0"/>
+              <a:t>4, 10&gt;,7)</a:t>
+            </a:r>
+            <a:endParaRPr lang="en-CA" dirty="0"/>
+          </a:p>
+        </p:txBody>
+      </p:sp>
+      <p:sp>
+        <p:nvSpPr>
+          <p:cNvPr id="28" name="TextBox 27"/>
+          <p:cNvSpPr txBox="1"/>
+          <p:nvPr/>
+        </p:nvSpPr>
+        <p:spPr>
+          <a:xfrm>
+            <a:off x="8267264" y="3065884"/>
+            <a:ext cx="1736373" cy="369332"/>
+          </a:xfrm>
+          <a:prstGeom prst="rect">
+            <a:avLst/>
+          </a:prstGeom>
+          <a:noFill/>
+        </p:spPr>
+        <p:txBody>
+          <a:bodyPr wrap="none" rtlCol="0">
+            <a:spAutoFit/>
+          </a:bodyPr>
+          <a:lstStyle/>
+          <a:p>
+            <a:r>
+              <a:rPr lang="en-US" dirty="0" smtClean="0"/>
+              <a:t>(&lt;4, </a:t>
+            </a:r>
+            <a:r>
+              <a:rPr lang="en-US" dirty="0" smtClean="0"/>
+              <a:t>12&gt;,</a:t>
+            </a:r>
+            <a:r>
+              <a:rPr lang="en-US" dirty="0" smtClean="0"/>
+              <a:t>5), </a:t>
+            </a:r>
+            <a:r>
+              <a:rPr lang="en-US" dirty="0" smtClean="0"/>
+              <a:t>(1,5</a:t>
+            </a:r>
+            <a:r>
+              <a:rPr lang="en-US" dirty="0" smtClean="0"/>
+              <a:t>)</a:t>
+            </a:r>
+            <a:endParaRPr lang="en-CA" dirty="0"/>
+          </a:p>
+        </p:txBody>
+      </p:sp>
+      <p:sp>
+        <p:nvSpPr>
+          <p:cNvPr id="29" name="TextBox 28"/>
+          <p:cNvSpPr txBox="1"/>
+          <p:nvPr/>
+        </p:nvSpPr>
+        <p:spPr>
+          <a:xfrm>
+            <a:off x="8643336" y="3767232"/>
+            <a:ext cx="1140056" cy="369332"/>
+          </a:xfrm>
+          <a:prstGeom prst="rect">
+            <a:avLst/>
+          </a:prstGeom>
+          <a:noFill/>
+        </p:spPr>
+        <p:txBody>
+          <a:bodyPr wrap="none" rtlCol="0">
+            <a:spAutoFit/>
+          </a:bodyPr>
+          <a:lstStyle/>
+          <a:p>
+            <a:r>
+              <a:rPr lang="en-US" dirty="0" smtClean="0"/>
+              <a:t>(&lt;</a:t>
+            </a:r>
+            <a:r>
+              <a:rPr lang="en-US" dirty="0" smtClean="0"/>
+              <a:t>2,11&gt;,</a:t>
+            </a:r>
+            <a:r>
+              <a:rPr lang="en-US" dirty="0" smtClean="0"/>
+              <a:t>6)</a:t>
+            </a:r>
+            <a:endParaRPr lang="en-CA" dirty="0"/>
+          </a:p>
+        </p:txBody>
+      </p:sp>
+      <p:sp>
+        <p:nvSpPr>
+          <p:cNvPr id="30" name="TextBox 29"/>
+          <p:cNvSpPr txBox="1"/>
+          <p:nvPr/>
+        </p:nvSpPr>
+        <p:spPr>
+          <a:xfrm>
+            <a:off x="1570241" y="4163396"/>
+            <a:ext cx="1160895" cy="369332"/>
+          </a:xfrm>
+          <a:prstGeom prst="rect">
+            <a:avLst/>
+          </a:prstGeom>
+          <a:noFill/>
+        </p:spPr>
+        <p:txBody>
+          <a:bodyPr wrap="none" rtlCol="0">
+            <a:spAutoFit/>
+          </a:bodyPr>
+          <a:lstStyle/>
+          <a:p>
+            <a:r>
+              <a:rPr lang="en-US" dirty="0" smtClean="0"/>
+              <a:t>(7,8</a:t>
+            </a:r>
+            <a:r>
+              <a:rPr lang="en-US" dirty="0"/>
+              <a:t>), </a:t>
+            </a:r>
+            <a:r>
+              <a:rPr lang="en-US" dirty="0" smtClean="0"/>
+              <a:t>(3,8)</a:t>
+            </a:r>
+            <a:endParaRPr lang="en-CA" dirty="0"/>
+          </a:p>
+        </p:txBody>
+      </p:sp>
+      <p:sp>
+        <p:nvSpPr>
+          <p:cNvPr id="31" name="TextBox 30"/>
+          <p:cNvSpPr txBox="1"/>
+          <p:nvPr/>
+        </p:nvSpPr>
+        <p:spPr>
+          <a:xfrm>
+            <a:off x="929402" y="4926580"/>
+            <a:ext cx="1704313" cy="369332"/>
+          </a:xfrm>
+          <a:prstGeom prst="rect">
+            <a:avLst/>
+          </a:prstGeom>
+          <a:noFill/>
+        </p:spPr>
+        <p:txBody>
+          <a:bodyPr wrap="none" rtlCol="0">
+            <a:spAutoFit/>
+          </a:bodyPr>
+          <a:lstStyle/>
+          <a:p>
+            <a:r>
+              <a:rPr lang="en-US" dirty="0" smtClean="0"/>
+              <a:t>(1,9), (1,9), </a:t>
+            </a:r>
+            <a:r>
+              <a:rPr lang="en-US" dirty="0" smtClean="0"/>
+              <a:t>(7,9)</a:t>
+            </a:r>
+            <a:endParaRPr lang="en-CA" dirty="0"/>
+          </a:p>
+        </p:txBody>
+      </p:sp>
+      <p:sp>
+        <p:nvSpPr>
+          <p:cNvPr id="32" name="TextBox 31"/>
+          <p:cNvSpPr txBox="1"/>
+          <p:nvPr/>
+        </p:nvSpPr>
+        <p:spPr>
+          <a:xfrm>
+            <a:off x="8333465" y="6435024"/>
+            <a:ext cx="1309974" cy="369332"/>
+          </a:xfrm>
+          <a:prstGeom prst="rect">
+            <a:avLst/>
+          </a:prstGeom>
+          <a:noFill/>
+        </p:spPr>
+        <p:txBody>
+          <a:bodyPr wrap="none" rtlCol="0">
+            <a:spAutoFit/>
+          </a:bodyPr>
+          <a:lstStyle/>
+          <a:p>
+            <a:r>
+              <a:rPr lang="en-US" dirty="0" smtClean="0"/>
+              <a:t>(&lt;4, </a:t>
+            </a:r>
+            <a:r>
+              <a:rPr lang="en-US" dirty="0" smtClean="0"/>
+              <a:t>12&gt;,12)</a:t>
+            </a:r>
+            <a:endParaRPr lang="en-CA" dirty="0"/>
+          </a:p>
+        </p:txBody>
+      </p:sp>
+      <p:sp>
+        <p:nvSpPr>
+          <p:cNvPr id="33" name="TextBox 32"/>
+          <p:cNvSpPr txBox="1"/>
+          <p:nvPr/>
+        </p:nvSpPr>
+        <p:spPr>
+          <a:xfrm>
+            <a:off x="428978" y="1186543"/>
+            <a:ext cx="4120230" cy="646331"/>
+          </a:xfrm>
+          <a:prstGeom prst="rect">
+            <a:avLst/>
+          </a:prstGeom>
+          <a:noFill/>
+        </p:spPr>
+        <p:txBody>
+          <a:bodyPr wrap="none" rtlCol="0">
+            <a:spAutoFit/>
+          </a:bodyPr>
+          <a:lstStyle/>
+          <a:p>
+            <a:r>
+              <a:rPr lang="en-US" dirty="0" smtClean="0"/>
+              <a:t>Definition of pairs:</a:t>
+            </a:r>
+          </a:p>
+          <a:p>
+            <a:r>
+              <a:rPr lang="en-US" dirty="0" smtClean="0"/>
+              <a:t>(where value is assigned, where it is used)</a:t>
+            </a:r>
+            <a:endParaRPr lang="en-CA" dirty="0"/>
+          </a:p>
+        </p:txBody>
+      </p:sp>
+      <p:sp>
+        <p:nvSpPr>
+          <p:cNvPr id="34" name="Right Brace 33"/>
+          <p:cNvSpPr/>
+          <p:nvPr/>
+        </p:nvSpPr>
+        <p:spPr>
+          <a:xfrm flipH="1">
+            <a:off x="3086215" y="5361604"/>
+            <a:ext cx="631372" cy="360988"/>
+          </a:xfrm>
+          <a:prstGeom prst="rightBrace">
+            <a:avLst/>
+          </a:prstGeom>
+        </p:spPr>
+        <p:style>
+          <a:lnRef idx="1">
+            <a:schemeClr val="accent1"/>
+          </a:lnRef>
+          <a:fillRef idx="0">
+            <a:schemeClr val="accent1"/>
+          </a:fillRef>
+          <a:effectRef idx="0">
+            <a:schemeClr val="accent1"/>
+          </a:effectRef>
+          <a:fontRef idx="minor">
+            <a:schemeClr val="tx1"/>
+          </a:fontRef>
+        </p:style>
+        <p:txBody>
+          <a:bodyPr rtlCol="0" anchor="ctr"/>
+          <a:lstStyle/>
+          <a:p>
+            <a:pPr algn="ctr"/>
+            <a:endParaRPr lang="en-CA"/>
+          </a:p>
+        </p:txBody>
+      </p:sp>
+      <p:sp>
+        <p:nvSpPr>
+          <p:cNvPr id="35" name="TextBox 34"/>
+          <p:cNvSpPr txBox="1"/>
+          <p:nvPr/>
+        </p:nvSpPr>
+        <p:spPr>
+          <a:xfrm>
+            <a:off x="2520549" y="5339452"/>
+            <a:ext cx="540533" cy="369332"/>
+          </a:xfrm>
+          <a:prstGeom prst="rect">
+            <a:avLst/>
+          </a:prstGeom>
+          <a:noFill/>
+        </p:spPr>
+        <p:txBody>
+          <a:bodyPr wrap="none" rtlCol="0">
+            <a:spAutoFit/>
+          </a:bodyPr>
+          <a:lstStyle/>
+          <a:p>
+            <a:r>
+              <a:rPr lang="en-US" dirty="0" smtClean="0"/>
+              <a:t>n10</a:t>
+            </a:r>
+            <a:endParaRPr lang="en-CA" dirty="0"/>
+          </a:p>
+        </p:txBody>
+      </p:sp>
+      <p:sp>
+        <p:nvSpPr>
+          <p:cNvPr id="36" name="Right Brace 35"/>
+          <p:cNvSpPr/>
+          <p:nvPr/>
+        </p:nvSpPr>
+        <p:spPr>
+          <a:xfrm flipH="1">
+            <a:off x="2433074" y="5982093"/>
+            <a:ext cx="631372" cy="360988"/>
+          </a:xfrm>
+          <a:prstGeom prst="rightBrace">
+            <a:avLst/>
+          </a:prstGeom>
+        </p:spPr>
+        <p:style>
+          <a:lnRef idx="1">
+            <a:schemeClr val="accent1"/>
+          </a:lnRef>
+          <a:fillRef idx="0">
+            <a:schemeClr val="accent1"/>
+          </a:fillRef>
+          <a:effectRef idx="0">
+            <a:schemeClr val="accent1"/>
+          </a:effectRef>
+          <a:fontRef idx="minor">
+            <a:schemeClr val="tx1"/>
+          </a:fontRef>
+        </p:style>
+        <p:txBody>
+          <a:bodyPr rtlCol="0" anchor="ctr"/>
+          <a:lstStyle/>
+          <a:p>
+            <a:pPr algn="ctr"/>
+            <a:endParaRPr lang="en-CA"/>
+          </a:p>
+        </p:txBody>
+      </p:sp>
+      <p:sp>
+        <p:nvSpPr>
+          <p:cNvPr id="37" name="TextBox 36"/>
+          <p:cNvSpPr txBox="1"/>
+          <p:nvPr/>
+        </p:nvSpPr>
+        <p:spPr>
+          <a:xfrm>
+            <a:off x="1921838" y="5959941"/>
+            <a:ext cx="540533" cy="369332"/>
+          </a:xfrm>
+          <a:prstGeom prst="rect">
+            <a:avLst/>
+          </a:prstGeom>
+          <a:noFill/>
+        </p:spPr>
+        <p:txBody>
+          <a:bodyPr wrap="none" rtlCol="0">
+            <a:spAutoFit/>
+          </a:bodyPr>
+          <a:lstStyle/>
+          <a:p>
+            <a:r>
+              <a:rPr lang="en-US" dirty="0" smtClean="0"/>
+              <a:t>n11</a:t>
+            </a:r>
+            <a:endParaRPr lang="en-CA" dirty="0"/>
+          </a:p>
+        </p:txBody>
+      </p:sp>
+      <p:cxnSp>
+        <p:nvCxnSpPr>
+          <p:cNvPr id="38" name="Straight Arrow Connector 37"/>
+          <p:cNvCxnSpPr/>
+          <p:nvPr/>
+        </p:nvCxnSpPr>
+        <p:spPr>
+          <a:xfrm>
+            <a:off x="798264" y="4675813"/>
+            <a:ext cx="192712" cy="364281"/>
+          </a:xfrm>
+          <a:prstGeom prst="straightConnector1">
+            <a:avLst/>
+          </a:prstGeom>
+          <a:ln>
+            <a:tailEnd type="triangle"/>
+          </a:ln>
+        </p:spPr>
+        <p:style>
+          <a:lnRef idx="1">
+            <a:schemeClr val="accent1"/>
+          </a:lnRef>
+          <a:fillRef idx="0">
+            <a:schemeClr val="accent1"/>
+          </a:fillRef>
+          <a:effectRef idx="0">
+            <a:schemeClr val="accent1"/>
+          </a:effectRef>
+          <a:fontRef idx="minor">
+            <a:schemeClr val="tx1"/>
+          </a:fontRef>
+        </p:style>
+      </p:cxnSp>
+      <p:sp>
+        <p:nvSpPr>
+          <p:cNvPr id="39" name="TextBox 38"/>
+          <p:cNvSpPr txBox="1"/>
+          <p:nvPr/>
+        </p:nvSpPr>
+        <p:spPr>
+          <a:xfrm>
+            <a:off x="498406" y="4343407"/>
+            <a:ext cx="599716" cy="369332"/>
+          </a:xfrm>
+          <a:prstGeom prst="rect">
+            <a:avLst/>
+          </a:prstGeom>
+          <a:noFill/>
+        </p:spPr>
+        <p:txBody>
+          <a:bodyPr wrap="none" rtlCol="0">
+            <a:spAutoFit/>
+          </a:bodyPr>
+          <a:lstStyle/>
+          <a:p>
+            <a:r>
+              <a:rPr lang="en-US" dirty="0" smtClean="0"/>
+              <a:t>data</a:t>
+            </a:r>
+            <a:endParaRPr lang="en-CA" dirty="0"/>
+          </a:p>
+        </p:txBody>
+      </p:sp>
+      <p:cxnSp>
+        <p:nvCxnSpPr>
+          <p:cNvPr id="40" name="Straight Arrow Connector 39"/>
+          <p:cNvCxnSpPr/>
+          <p:nvPr/>
+        </p:nvCxnSpPr>
+        <p:spPr>
+          <a:xfrm flipV="1">
+            <a:off x="1589225" y="5311461"/>
+            <a:ext cx="96356" cy="230637"/>
+          </a:xfrm>
+          <a:prstGeom prst="straightConnector1">
+            <a:avLst/>
+          </a:prstGeom>
+          <a:ln>
+            <a:tailEnd type="triangle"/>
+          </a:ln>
+        </p:spPr>
+        <p:style>
+          <a:lnRef idx="1">
+            <a:schemeClr val="accent1"/>
+          </a:lnRef>
+          <a:fillRef idx="0">
+            <a:schemeClr val="accent1"/>
+          </a:fillRef>
+          <a:effectRef idx="0">
+            <a:schemeClr val="accent1"/>
+          </a:effectRef>
+          <a:fontRef idx="minor">
+            <a:schemeClr val="tx1"/>
+          </a:fontRef>
+        </p:style>
+      </p:cxnSp>
+      <p:sp>
+        <p:nvSpPr>
+          <p:cNvPr id="41" name="TextBox 40"/>
+          <p:cNvSpPr txBox="1"/>
+          <p:nvPr/>
+        </p:nvSpPr>
+        <p:spPr>
+          <a:xfrm>
+            <a:off x="809742" y="5377944"/>
+            <a:ext cx="883255" cy="369332"/>
+          </a:xfrm>
+          <a:prstGeom prst="rect">
+            <a:avLst/>
+          </a:prstGeom>
+          <a:noFill/>
+        </p:spPr>
+        <p:txBody>
+          <a:bodyPr wrap="none" rtlCol="0">
+            <a:spAutoFit/>
+          </a:bodyPr>
+          <a:lstStyle/>
+          <a:p>
+            <a:r>
+              <a:rPr lang="en-US" dirty="0" smtClean="0"/>
+              <a:t>column</a:t>
+            </a:r>
+            <a:endParaRPr lang="en-CA" dirty="0"/>
+          </a:p>
+        </p:txBody>
+      </p:sp>
+      <p:sp>
+        <p:nvSpPr>
+          <p:cNvPr id="43" name="TextBox 42"/>
+          <p:cNvSpPr txBox="1"/>
+          <p:nvPr/>
+        </p:nvSpPr>
+        <p:spPr>
+          <a:xfrm>
+            <a:off x="1900232" y="5349966"/>
+            <a:ext cx="734496" cy="369332"/>
+          </a:xfrm>
+          <a:prstGeom prst="rect">
+            <a:avLst/>
+          </a:prstGeom>
+          <a:noFill/>
+        </p:spPr>
+        <p:txBody>
+          <a:bodyPr wrap="none" rtlCol="0">
+            <a:spAutoFit/>
+          </a:bodyPr>
+          <a:lstStyle/>
+          <a:p>
+            <a:r>
+              <a:rPr lang="en-US" dirty="0" smtClean="0"/>
+              <a:t>(</a:t>
+            </a:r>
+            <a:r>
+              <a:rPr lang="en-US" dirty="0" smtClean="0"/>
+              <a:t>9</a:t>
+            </a:r>
+            <a:r>
+              <a:rPr lang="en-US" dirty="0" smtClean="0"/>
+              <a:t>,10)</a:t>
+            </a:r>
+            <a:endParaRPr lang="en-CA" dirty="0"/>
+          </a:p>
+        </p:txBody>
+      </p:sp>
+      <p:sp>
+        <p:nvSpPr>
+          <p:cNvPr id="44" name="TextBox 43"/>
+          <p:cNvSpPr txBox="1"/>
+          <p:nvPr/>
+        </p:nvSpPr>
+        <p:spPr>
+          <a:xfrm>
+            <a:off x="1136815" y="5941984"/>
+            <a:ext cx="734496" cy="369332"/>
+          </a:xfrm>
+          <a:prstGeom prst="rect">
+            <a:avLst/>
+          </a:prstGeom>
+          <a:noFill/>
+        </p:spPr>
+        <p:txBody>
+          <a:bodyPr wrap="none" rtlCol="0">
+            <a:spAutoFit/>
+          </a:bodyPr>
+          <a:lstStyle/>
+          <a:p>
+            <a:r>
+              <a:rPr lang="en-US" dirty="0" smtClean="0"/>
+              <a:t>(</a:t>
+            </a:r>
+            <a:r>
+              <a:rPr lang="en-US" dirty="0" smtClean="0"/>
+              <a:t>9</a:t>
+            </a:r>
+            <a:r>
+              <a:rPr lang="en-US" dirty="0" smtClean="0"/>
+              <a:t>,11)</a:t>
+            </a:r>
+            <a:endParaRPr lang="en-CA" dirty="0"/>
+          </a:p>
+        </p:txBody>
+      </p:sp>
+    </p:spTree>
+    <p:extLst>
+      <p:ext uri="{BB962C8B-B14F-4D97-AF65-F5344CB8AC3E}">
+        <p14:creationId xmlns:p14="http://schemas.microsoft.com/office/powerpoint/2010/main" val="4016359732"/>
+      </p:ext>
+    </p:extLst>
+  </p:cSld>
+  <p:clrMapOvr>
+    <a:masterClrMapping/>
+  </p:clrMapOvr>
+</p:sld>
+</file>
+
+<file path=ppt/slides/slide4.xml><?xml version="1.0" encoding="utf-8"?>
+<p:sld xmlns:a="http://schemas.openxmlformats.org/drawingml/2006/main" xmlns:r="http://schemas.openxmlformats.org/officeDocument/2006/relationships" xmlns:p="http://schemas.openxmlformats.org/presentationml/2006/main">
+  <p:cSld>
+    <p:spTree>
+      <p:nvGrpSpPr>
+        <p:cNvPr id="1" name=""/>
+        <p:cNvGrpSpPr/>
+        <p:nvPr/>
+      </p:nvGrpSpPr>
+      <p:grpSpPr>
+        <a:xfrm>
+          <a:off x="0" y="0"/>
+          <a:ext cx="0" cy="0"/>
+          <a:chOff x="0" y="0"/>
+          <a:chExt cx="0" cy="0"/>
+        </a:xfrm>
+      </p:grpSpPr>
+      <p:sp>
+        <p:nvSpPr>
+          <p:cNvPr id="2" name="Title 1"/>
+          <p:cNvSpPr>
+            <a:spLocks noGrp="1"/>
+          </p:cNvSpPr>
+          <p:nvPr>
+            <p:ph type="title"/>
+          </p:nvPr>
+        </p:nvSpPr>
+        <p:spPr/>
+        <p:txBody>
+          <a:bodyPr/>
+          <a:lstStyle/>
+          <a:p>
+            <a:r>
+              <a:rPr lang="en-US" dirty="0" smtClean="0"/>
+              <a:t>Per Variable</a:t>
+            </a:r>
+            <a:endParaRPr lang="en-CA" dirty="0"/>
+          </a:p>
+        </p:txBody>
+      </p:sp>
+      <p:sp>
+        <p:nvSpPr>
+          <p:cNvPr id="3" name="Content Placeholder 2"/>
+          <p:cNvSpPr>
+            <a:spLocks noGrp="1"/>
+          </p:cNvSpPr>
+          <p:nvPr>
+            <p:ph idx="1"/>
+          </p:nvPr>
+        </p:nvSpPr>
+        <p:spPr/>
+        <p:txBody>
+          <a:bodyPr/>
+          <a:lstStyle/>
+          <a:p>
+            <a:r>
+              <a:rPr lang="pt-BR" dirty="0"/>
+              <a:t>data: (1,3), (1,1), (1,9)</a:t>
+            </a:r>
+          </a:p>
+          <a:p>
+            <a:r>
+              <a:rPr lang="pt-BR" dirty="0"/>
+              <a:t>column: (1,9)</a:t>
+            </a:r>
+          </a:p>
+          <a:p>
+            <a:r>
+              <a:rPr lang="pt-BR" dirty="0"/>
+              <a:t>total:(&lt;2,11&gt;,6),(&lt;2,11&gt;,11)</a:t>
+            </a:r>
+          </a:p>
+          <a:p>
+            <a:r>
+              <a:rPr lang="pt-BR" dirty="0"/>
+              <a:t>validRows:(1,5), (1,7)</a:t>
+            </a:r>
+          </a:p>
+          <a:p>
+            <a:r>
+              <a:rPr lang="pt-BR" dirty="0"/>
+              <a:t>rowCount: (3,8)</a:t>
+            </a:r>
+          </a:p>
+          <a:p>
+            <a:r>
+              <a:rPr lang="pt-BR" dirty="0"/>
+              <a:t>v: (&lt;4,12&gt;,5), (&lt;4,12&gt;,12)</a:t>
+            </a:r>
+          </a:p>
+          <a:p>
+            <a:r>
+              <a:rPr lang="pt-BR" dirty="0"/>
+              <a:t>n: (9,10), (9,11)</a:t>
+            </a:r>
+            <a:endParaRPr lang="en-CA" dirty="0"/>
+          </a:p>
+        </p:txBody>
+      </p:sp>
+    </p:spTree>
+    <p:extLst>
+      <p:ext uri="{BB962C8B-B14F-4D97-AF65-F5344CB8AC3E}">
+        <p14:creationId xmlns:p14="http://schemas.microsoft.com/office/powerpoint/2010/main" val="346312990"/>
       </p:ext>
     </p:extLst>
   </p:cSld>

</xml_diff>